<commit_message>
Doc update V.96a fixes a ref error
</commit_message>
<xml_diff>
--- a/resources/trunk/docs/QR-ID-presentation.pptx
+++ b/resources/trunk/docs/QR-ID-presentation.pptx
@@ -290,7 +290,7 @@
           <a:p>
             <a:fld id="{8DC50CBA-2535-42FA-B624-6206B5B40E9C}" type="datetimeFigureOut">
               <a:rPr lang="en-US" smtClean="0"/>
-              <a:t>2013-07-03</a:t>
+              <a:t>2013-11-22</a:t>
             </a:fld>
             <a:endParaRPr lang="en-US"/>
           </a:p>
@@ -460,7 +460,7 @@
           <a:p>
             <a:fld id="{8DC50CBA-2535-42FA-B624-6206B5B40E9C}" type="datetimeFigureOut">
               <a:rPr lang="en-US" smtClean="0"/>
-              <a:t>2013-07-03</a:t>
+              <a:t>2013-11-22</a:t>
             </a:fld>
             <a:endParaRPr lang="en-US"/>
           </a:p>
@@ -640,7 +640,7 @@
           <a:p>
             <a:fld id="{8DC50CBA-2535-42FA-B624-6206B5B40E9C}" type="datetimeFigureOut">
               <a:rPr lang="en-US" smtClean="0"/>
-              <a:t>2013-07-03</a:t>
+              <a:t>2013-11-22</a:t>
             </a:fld>
             <a:endParaRPr lang="en-US"/>
           </a:p>
@@ -810,7 +810,7 @@
           <a:p>
             <a:fld id="{8DC50CBA-2535-42FA-B624-6206B5B40E9C}" type="datetimeFigureOut">
               <a:rPr lang="en-US" smtClean="0"/>
-              <a:t>2013-07-03</a:t>
+              <a:t>2013-11-22</a:t>
             </a:fld>
             <a:endParaRPr lang="en-US"/>
           </a:p>
@@ -1056,7 +1056,7 @@
           <a:p>
             <a:fld id="{8DC50CBA-2535-42FA-B624-6206B5B40E9C}" type="datetimeFigureOut">
               <a:rPr lang="en-US" smtClean="0"/>
-              <a:t>2013-07-03</a:t>
+              <a:t>2013-11-22</a:t>
             </a:fld>
             <a:endParaRPr lang="en-US"/>
           </a:p>
@@ -1344,7 +1344,7 @@
           <a:p>
             <a:fld id="{8DC50CBA-2535-42FA-B624-6206B5B40E9C}" type="datetimeFigureOut">
               <a:rPr lang="en-US" smtClean="0"/>
-              <a:t>2013-07-03</a:t>
+              <a:t>2013-11-22</a:t>
             </a:fld>
             <a:endParaRPr lang="en-US"/>
           </a:p>
@@ -1766,7 +1766,7 @@
           <a:p>
             <a:fld id="{8DC50CBA-2535-42FA-B624-6206B5B40E9C}" type="datetimeFigureOut">
               <a:rPr lang="en-US" smtClean="0"/>
-              <a:t>2013-07-03</a:t>
+              <a:t>2013-11-22</a:t>
             </a:fld>
             <a:endParaRPr lang="en-US"/>
           </a:p>
@@ -1884,7 +1884,7 @@
           <a:p>
             <a:fld id="{8DC50CBA-2535-42FA-B624-6206B5B40E9C}" type="datetimeFigureOut">
               <a:rPr lang="en-US" smtClean="0"/>
-              <a:t>2013-07-03</a:t>
+              <a:t>2013-11-22</a:t>
             </a:fld>
             <a:endParaRPr lang="en-US"/>
           </a:p>
@@ -1979,7 +1979,7 @@
           <a:p>
             <a:fld id="{8DC50CBA-2535-42FA-B624-6206B5B40E9C}" type="datetimeFigureOut">
               <a:rPr lang="en-US" smtClean="0"/>
-              <a:t>2013-07-03</a:t>
+              <a:t>2013-11-22</a:t>
             </a:fld>
             <a:endParaRPr lang="en-US"/>
           </a:p>
@@ -2256,7 +2256,7 @@
           <a:p>
             <a:fld id="{8DC50CBA-2535-42FA-B624-6206B5B40E9C}" type="datetimeFigureOut">
               <a:rPr lang="en-US" smtClean="0"/>
-              <a:t>2013-07-03</a:t>
+              <a:t>2013-11-22</a:t>
             </a:fld>
             <a:endParaRPr lang="en-US"/>
           </a:p>
@@ -2509,7 +2509,7 @@
           <a:p>
             <a:fld id="{8DC50CBA-2535-42FA-B624-6206B5B40E9C}" type="datetimeFigureOut">
               <a:rPr lang="en-US" smtClean="0"/>
-              <a:t>2013-07-03</a:t>
+              <a:t>2013-11-22</a:t>
             </a:fld>
             <a:endParaRPr lang="en-US"/>
           </a:p>
@@ -2722,7 +2722,7 @@
           <a:p>
             <a:fld id="{8DC50CBA-2535-42FA-B624-6206B5B40E9C}" type="datetimeFigureOut">
               <a:rPr lang="en-US" smtClean="0"/>
-              <a:t>2013-07-03</a:t>
+              <a:t>2013-11-22</a:t>
             </a:fld>
             <a:endParaRPr lang="en-US"/>
           </a:p>
@@ -3137,8 +3137,8 @@
         </p:nvSpPr>
         <p:spPr bwMode="auto">
           <a:xfrm>
-            <a:off x="533400" y="2224713"/>
-            <a:ext cx="8077200" cy="3185487"/>
+            <a:off x="533400" y="2086214"/>
+            <a:ext cx="8077200" cy="3462486"/>
           </a:xfrm>
           <a:prstGeom prst="rect">
             <a:avLst/>
@@ -3320,8 +3320,33 @@
                 <a:latin typeface="Arial" pitchFamily="34" charset="0"/>
                 <a:cs typeface="Arial" pitchFamily="34" charset="0"/>
               </a:rPr>
-              <a:t>No counter/time-stamp per user state-holding needed in the server </a:t>
-            </a:r>
+              <a:t>No counter/time-stamp per user state-holding needed in the </a:t>
+            </a:r>
+            <a:r>
+              <a:rPr kumimoji="0" lang="en-US" b="0" i="0" u="none" strike="noStrike" cap="none" normalizeH="0" baseline="0" dirty="0" smtClean="0">
+                <a:ln>
+                  <a:noFill/>
+                </a:ln>
+                <a:solidFill>
+                  <a:schemeClr val="tx1"/>
+                </a:solidFill>
+                <a:effectLst/>
+                <a:latin typeface="Arial" pitchFamily="34" charset="0"/>
+                <a:cs typeface="Arial" pitchFamily="34" charset="0"/>
+              </a:rPr>
+              <a:t>server, a root certificate + OCSP/CRL  suffice</a:t>
+            </a:r>
+            <a:endParaRPr kumimoji="0" lang="en-US" b="0" i="0" u="none" strike="noStrike" cap="none" normalizeH="0" baseline="0" dirty="0" smtClean="0">
+              <a:ln>
+                <a:noFill/>
+              </a:ln>
+              <a:solidFill>
+                <a:schemeClr val="tx1"/>
+              </a:solidFill>
+              <a:effectLst/>
+              <a:latin typeface="Arial" pitchFamily="34" charset="0"/>
+              <a:cs typeface="Arial" pitchFamily="34" charset="0"/>
+            </a:endParaRPr>
           </a:p>
           <a:p>
             <a:pPr marL="171450" marR="0" lvl="0" indent="-171450" algn="l" defTabSz="914400" rtl="0" eaLnBrk="1" fontAlgn="base" latinLnBrk="0" hangingPunct="1">
@@ -3470,6 +3495,74 @@
           </a:p>
         </p:txBody>
       </p:sp>
+      <p:pic>
+        <p:nvPicPr>
+          <p:cNvPr id="5" name="Picture 4"/>
+          <p:cNvPicPr>
+            <a:picLocks noChangeAspect="1" noChangeArrowheads="1"/>
+          </p:cNvPicPr>
+          <p:nvPr/>
+        </p:nvPicPr>
+        <p:blipFill>
+          <a:blip r:embed="rId2">
+            <a:extLst>
+              <a:ext uri="{28A0092B-C50C-407E-A947-70E740481C1C}">
+                <a14:useLocalDpi xmlns:a14="http://schemas.microsoft.com/office/drawing/2010/main" val="0"/>
+              </a:ext>
+            </a:extLst>
+          </a:blip>
+          <a:srcRect/>
+          <a:stretch>
+            <a:fillRect/>
+          </a:stretch>
+        </p:blipFill>
+        <p:spPr bwMode="auto">
+          <a:xfrm>
+            <a:off x="7467600" y="6248400"/>
+            <a:ext cx="1452562" cy="433387"/>
+          </a:xfrm>
+          <a:prstGeom prst="rect">
+            <a:avLst/>
+          </a:prstGeom>
+          <a:noFill/>
+          <a:ln>
+            <a:noFill/>
+          </a:ln>
+          <a:effectLst/>
+          <a:extLst>
+            <a:ext uri="{909E8E84-426E-40DD-AFC4-6F175D3DCCD1}">
+              <a14:hiddenFill xmlns:a14="http://schemas.microsoft.com/office/drawing/2010/main">
+                <a:blipFill dpi="0" rotWithShape="0">
+                  <a:blip/>
+                  <a:srcRect/>
+                  <a:stretch>
+                    <a:fillRect/>
+                  </a:stretch>
+                </a:blipFill>
+              </a14:hiddenFill>
+            </a:ext>
+            <a:ext uri="{91240B29-F687-4F45-9708-019B960494DF}">
+              <a14:hiddenLine xmlns:a14="http://schemas.microsoft.com/office/drawing/2010/main" w="9525">
+                <a:solidFill>
+                  <a:srgbClr val="000000"/>
+                </a:solidFill>
+                <a:round/>
+                <a:headEnd/>
+                <a:tailEnd/>
+              </a14:hiddenLine>
+            </a:ext>
+            <a:ext uri="{AF507438-7753-43E0-B8FC-AC1667EBCBE1}">
+              <a14:hiddenEffects xmlns:a14="http://schemas.microsoft.com/office/drawing/2010/main">
+                <a:effectLst>
+                  <a:outerShdw dist="35921" dir="2700000" algn="ctr" rotWithShape="0">
+                    <a:srgbClr val="808080"/>
+                  </a:outerShdw>
+                </a:effectLst>
+              </a14:hiddenEffects>
+            </a:ext>
+          </a:extLst>
+        </p:spPr>
+      </p:pic>
     </p:spTree>
     <p:extLst>
       <p:ext uri="{BB962C8B-B14F-4D97-AF65-F5344CB8AC3E}">
@@ -4224,57 +4317,43 @@
                 <a:latin typeface="Arial" pitchFamily="34" charset="0"/>
                 <a:cs typeface="Arial" pitchFamily="34" charset="0"/>
               </a:rPr>
-              <a:t>The user opens the QR ID app and points to the web page.  When the QR ID is recognized the app automatically invokes the authentication </a:t>
-            </a:r>
+              <a:t>The user opens the QR ID app and points to the web page.  When the QR ID is recognized the app automatically invokes the authentication app.</a:t>
+            </a:r>
+            <a:endParaRPr lang="en-US" sz="1000" dirty="0">
+              <a:latin typeface="Arial" pitchFamily="34" charset="0"/>
+              <a:cs typeface="Arial" pitchFamily="34" charset="0"/>
+            </a:endParaRPr>
+          </a:p>
+        </p:txBody>
+      </p:sp>
+      <p:sp>
+        <p:nvSpPr>
+          <p:cNvPr id="40" name="TextBox 39"/>
+          <p:cNvSpPr txBox="1"/>
+          <p:nvPr/>
+        </p:nvSpPr>
+        <p:spPr>
+          <a:xfrm>
+            <a:off x="6035724" y="6019800"/>
+            <a:ext cx="2803476" cy="707886"/>
+          </a:xfrm>
+          <a:prstGeom prst="rect">
+            <a:avLst/>
+          </a:prstGeom>
+          <a:noFill/>
+        </p:spPr>
+        <p:txBody>
+          <a:bodyPr wrap="square" rtlCol="0">
+            <a:spAutoFit/>
+          </a:bodyPr>
+          <a:lstStyle/>
+          <a:p>
             <a:r>
               <a:rPr lang="en-US" sz="1000" dirty="0" smtClean="0">
                 <a:latin typeface="Arial" pitchFamily="34" charset="0"/>
                 <a:cs typeface="Arial" pitchFamily="34" charset="0"/>
               </a:rPr>
-              <a:t>app.</a:t>
-            </a:r>
-            <a:endParaRPr lang="en-US" sz="1000" dirty="0">
-              <a:latin typeface="Arial" pitchFamily="34" charset="0"/>
-              <a:cs typeface="Arial" pitchFamily="34" charset="0"/>
-            </a:endParaRPr>
-          </a:p>
-        </p:txBody>
-      </p:sp>
-      <p:sp>
-        <p:nvSpPr>
-          <p:cNvPr id="40" name="TextBox 39"/>
-          <p:cNvSpPr txBox="1"/>
-          <p:nvPr/>
-        </p:nvSpPr>
-        <p:spPr>
-          <a:xfrm>
-            <a:off x="6035724" y="6019800"/>
-            <a:ext cx="2803476" cy="707886"/>
-          </a:xfrm>
-          <a:prstGeom prst="rect">
-            <a:avLst/>
-          </a:prstGeom>
-          <a:noFill/>
-        </p:spPr>
-        <p:txBody>
-          <a:bodyPr wrap="square" rtlCol="0">
-            <a:spAutoFit/>
-          </a:bodyPr>
-          <a:lstStyle/>
-          <a:p>
-            <a:r>
-              <a:rPr lang="en-US" sz="1000" dirty="0" smtClean="0">
-                <a:latin typeface="Arial" pitchFamily="34" charset="0"/>
-                <a:cs typeface="Arial" pitchFamily="34" charset="0"/>
-              </a:rPr>
-              <a:t>The user is presented with a login app and responds with a PIN to activate the credential.  After that the user should be able to use the service from the PC (not shown here</a:t>
-            </a:r>
-            <a:r>
-              <a:rPr lang="en-US" sz="1000" dirty="0" smtClean="0">
-                <a:latin typeface="Arial" pitchFamily="34" charset="0"/>
-                <a:cs typeface="Arial" pitchFamily="34" charset="0"/>
-              </a:rPr>
-              <a:t>).</a:t>
+              <a:t>The user is presented with a login app and responds with a PIN to activate the credential.  After that the user should be able to use the service from the PC (not shown here).</a:t>
             </a:r>
             <a:endParaRPr lang="en-US" sz="1000" dirty="0">
               <a:latin typeface="Arial" pitchFamily="34" charset="0"/>
@@ -5904,7 +5983,56 @@
                 <a:latin typeface="Arial" pitchFamily="34" charset="0"/>
                 <a:cs typeface="Arial" pitchFamily="34" charset="0"/>
               </a:rPr>
-              <a:t>The Authentication request message contains a challenge and optional credential filters in XML format.</a:t>
+              <a:t>The Authentication request message contains a </a:t>
+            </a:r>
+            <a:r>
+              <a:rPr lang="en-US" sz="1000" i="1" dirty="0" smtClean="0">
+                <a:latin typeface="Arial" pitchFamily="34" charset="0"/>
+                <a:cs typeface="Arial" pitchFamily="34" charset="0"/>
+              </a:rPr>
+              <a:t>challenge</a:t>
+            </a:r>
+            <a:r>
+              <a:rPr lang="en-US" sz="1000" dirty="0" smtClean="0">
+                <a:latin typeface="Arial" pitchFamily="34" charset="0"/>
+                <a:cs typeface="Arial" pitchFamily="34" charset="0"/>
+              </a:rPr>
+              <a:t> and optional </a:t>
+            </a:r>
+            <a:r>
+              <a:rPr lang="en-US" sz="1000" i="1" dirty="0" smtClean="0">
+                <a:latin typeface="Arial" pitchFamily="34" charset="0"/>
+                <a:cs typeface="Arial" pitchFamily="34" charset="0"/>
+              </a:rPr>
+              <a:t>credential filters</a:t>
+            </a:r>
+            <a:r>
+              <a:rPr lang="en-US" sz="1000" dirty="0" smtClean="0">
+                <a:latin typeface="Arial" pitchFamily="34" charset="0"/>
+                <a:cs typeface="Arial" pitchFamily="34" charset="0"/>
+              </a:rPr>
+              <a:t> in </a:t>
+            </a:r>
+            <a:r>
+              <a:rPr lang="en-US" sz="1000" dirty="0" smtClean="0">
+                <a:latin typeface="Arial" pitchFamily="34" charset="0"/>
+                <a:cs typeface="Arial" pitchFamily="34" charset="0"/>
+              </a:rPr>
+              <a:t>JSON</a:t>
+            </a:r>
+            <a:r>
+              <a:rPr lang="en-US" sz="1000" dirty="0" smtClean="0">
+                <a:latin typeface="Arial" pitchFamily="34" charset="0"/>
+                <a:cs typeface="Arial" pitchFamily="34" charset="0"/>
+              </a:rPr>
+              <a:t> </a:t>
+            </a:r>
+            <a:r>
+              <a:rPr lang="en-US" sz="1000" dirty="0" smtClean="0">
+                <a:latin typeface="Arial" pitchFamily="34" charset="0"/>
+                <a:cs typeface="Arial" pitchFamily="34" charset="0"/>
+              </a:rPr>
+              <a:t>format.</a:t>
             </a:r>
           </a:p>
           <a:p>
@@ -5919,21 +6047,14 @@
                 <a:latin typeface="Arial" pitchFamily="34" charset="0"/>
                 <a:cs typeface="Arial" pitchFamily="34" charset="0"/>
               </a:rPr>
-              <a:t>The Authentication response contains  the challenge signed by the private key + the associated X.509 certificate using XML </a:t>
-            </a:r>
-            <a:r>
-              <a:rPr lang="en-US" sz="1000" dirty="0" err="1" smtClean="0">
-                <a:latin typeface="Arial" pitchFamily="34" charset="0"/>
-                <a:cs typeface="Arial" pitchFamily="34" charset="0"/>
-              </a:rPr>
-              <a:t>DSig</a:t>
+              <a:t>The Authentication response contains  the challenge signed by the private key + the associated X.509 certificate using </a:t>
             </a:r>
             <a:r>
               <a:rPr lang="en-US" sz="1000" dirty="0" smtClean="0">
                 <a:latin typeface="Arial" pitchFamily="34" charset="0"/>
                 <a:cs typeface="Arial" pitchFamily="34" charset="0"/>
               </a:rPr>
-              <a:t>.</a:t>
+              <a:t>a JSON signature.</a:t>
             </a:r>
             <a:endParaRPr lang="en-US" sz="1000" dirty="0">
               <a:latin typeface="Arial" pitchFamily="34" charset="0"/>
@@ -6006,14 +6127,7 @@
                 <a:latin typeface="Arial" pitchFamily="34" charset="0"/>
                 <a:cs typeface="Arial" pitchFamily="34" charset="0"/>
               </a:rPr>
-              <a:t>V0.5, AR </a:t>
-            </a:r>
-            <a:r>
-              <a:rPr lang="en-US" sz="800" dirty="0" smtClean="0">
-                <a:latin typeface="Arial" pitchFamily="34" charset="0"/>
-                <a:cs typeface="Arial" pitchFamily="34" charset="0"/>
-              </a:rPr>
-              <a:t>2013-07-03</a:t>
+              <a:t>V0.5, AR 2013-07-03</a:t>
             </a:r>
             <a:endParaRPr lang="en-US" sz="800" dirty="0">
               <a:latin typeface="Arial" pitchFamily="34" charset="0"/>

</xml_diff>